<commit_message>
update sign in logic
</commit_message>
<xml_diff>
--- a/Spring Security 认证流程.pptx
+++ b/Spring Security 认证流程.pptx
@@ -5,13 +5,13 @@
     <p:sldMasterId id="2147483648" r:id="rId1"/>
   </p:sldMasterIdLst>
   <p:notesMasterIdLst>
-    <p:notesMasterId r:id="rId7"/>
+    <p:notesMasterId r:id="rId6"/>
   </p:notesMasterIdLst>
   <p:sldIdLst>
     <p:sldId id="256" r:id="rId3"/>
     <p:sldId id="257" r:id="rId4"/>
     <p:sldId id="258" r:id="rId5"/>
-    <p:sldId id="262" r:id="rId6"/>
+    <p:sldId id="262" r:id="rId7"/>
   </p:sldIdLst>
   <p:sldSz cx="12192000" cy="6858000"/>
   <p:notesSz cx="6858000" cy="9144000"/>
@@ -458,6 +458,161 @@
     </a:lvl9pPr>
   </p:notesStyle>
 </p:notesMaster>
+</file>
+
+<file path=ppt/notesSlides/notesSlide1.xml><?xml version="1.0" encoding="utf-8"?>
+<p:notes xmlns:a="http://schemas.openxmlformats.org/drawingml/2006/main" xmlns:r="http://schemas.openxmlformats.org/officeDocument/2006/relationships" xmlns:p="http://schemas.openxmlformats.org/presentationml/2006/main">
+  <p:cSld>
+    <p:spTree>
+      <p:nvGrpSpPr>
+        <p:cNvPr id="1" name=""/>
+        <p:cNvGrpSpPr/>
+        <p:nvPr/>
+      </p:nvGrpSpPr>
+      <p:grpSpPr/>
+      <p:sp>
+        <p:nvSpPr>
+          <p:cNvPr id="2" name="幻灯片图像占位符 1"/>
+          <p:cNvSpPr/>
+          <p:nvPr>
+            <p:ph type="sldImg" idx="2"/>
+          </p:nvPr>
+        </p:nvSpPr>
+        <p:spPr/>
+      </p:sp>
+      <p:sp>
+        <p:nvSpPr>
+          <p:cNvPr id="3" name="文本占位符 2"/>
+          <p:cNvSpPr/>
+          <p:nvPr>
+            <p:ph type="body" idx="3"/>
+          </p:nvPr>
+        </p:nvSpPr>
+        <p:spPr/>
+        <p:txBody>
+          <a:bodyPr/>
+          <a:p>
+            <a:r>
+              <a:rPr lang="en-US" altLang="zh-CN"/>
+              <a:t>1. Spring Security </a:t>
+            </a:r>
+            <a:r>
+              <a:rPr lang="zh-CN" altLang="en-US"/>
+              <a:t>本质上是一个过滤器链，一般的应用会有十几个过滤器</a:t>
+            </a:r>
+            <a:endParaRPr lang="zh-CN" altLang="en-US"/>
+          </a:p>
+          <a:p>
+            <a:r>
+              <a:rPr lang="en-US" altLang="zh-CN"/>
+              <a:t>2. UsernamePasswordAuthenticationFilter</a:t>
+            </a:r>
+            <a:r>
+              <a:rPr lang="zh-CN" altLang="en-US"/>
+              <a:t>： 表单登录处理</a:t>
+            </a:r>
+            <a:endParaRPr lang="zh-CN" altLang="en-US"/>
+          </a:p>
+          <a:p>
+            <a:r>
+              <a:rPr lang="en-US" altLang="zh-CN"/>
+              <a:t>3. BasicAuthenticationFilter</a:t>
+            </a:r>
+            <a:r>
+              <a:rPr lang="zh-CN" altLang="en-US"/>
+              <a:t>： 基本认证处理</a:t>
+            </a:r>
+            <a:endParaRPr lang="zh-CN" altLang="en-US"/>
+          </a:p>
+          <a:p>
+            <a:r>
+              <a:rPr lang="en-US" altLang="zh-CN"/>
+              <a:t>4. FilterSecurityIntercepter</a:t>
+            </a:r>
+            <a:r>
+              <a:rPr lang="zh-CN" altLang="en-US"/>
+              <a:t>： </a:t>
+            </a:r>
+            <a:r>
+              <a:rPr lang="en-US" altLang="zh-CN"/>
+              <a:t>Security</a:t>
+            </a:r>
+            <a:r>
+              <a:rPr lang="zh-CN" altLang="en-US"/>
+              <a:t>过滤器链最后一环</a:t>
+            </a:r>
+            <a:endParaRPr lang="zh-CN" altLang="en-US"/>
+          </a:p>
+          <a:p>
+            <a:r>
+              <a:rPr lang="en-US" altLang="zh-CN"/>
+              <a:t>5. </a:t>
+            </a:r>
+            <a:r>
+              <a:rPr lang="zh-CN" altLang="en-US"/>
+              <a:t>若某请求在S</a:t>
+            </a:r>
+            <a:r>
+              <a:rPr lang="en-US" altLang="zh-CN"/>
+              <a:t>pring Security</a:t>
+            </a:r>
+            <a:r>
+              <a:rPr lang="zh-CN" altLang="en-US"/>
+              <a:t>最后款</a:t>
+            </a:r>
+            <a:r>
+              <a:rPr lang="en-US" altLang="zh-CN"/>
+              <a:t>FilterSecurityInterceptor</a:t>
+            </a:r>
+            <a:r>
+              <a:rPr lang="zh-CN" altLang="en-US"/>
+              <a:t>被拦截，</a:t>
+            </a:r>
+            <a:r>
+              <a:rPr lang="en-US" altLang="zh-CN"/>
+              <a:t>FilterSecurityIntercepter</a:t>
+            </a:r>
+            <a:r>
+              <a:rPr lang="zh-CN" altLang="en-US"/>
+              <a:t>将会抛出异常，该异常由</a:t>
+            </a:r>
+            <a:r>
+              <a:rPr lang="en-US" altLang="zh-CN"/>
+              <a:t>ExceptionTranslationFilter</a:t>
+            </a:r>
+            <a:r>
+              <a:rPr lang="zh-CN" altLang="en-US"/>
+              <a:t>捕获并加一处理，如引导用户至登录界面。</a:t>
+            </a:r>
+            <a:br>
+              <a:rPr lang="zh-CN" altLang="en-US"/>
+            </a:br>
+            <a:r>
+              <a:rPr lang="en-US" altLang="zh-CN"/>
+              <a:t>6. ExceptionTranslationFilter</a:t>
+            </a:r>
+            <a:r>
+              <a:rPr lang="zh-CN" altLang="en-US"/>
+              <a:t>和</a:t>
+            </a:r>
+            <a:r>
+              <a:rPr lang="en-US" altLang="zh-CN"/>
+              <a:t>FilterSecurityIntercepter</a:t>
+            </a:r>
+            <a:r>
+              <a:rPr lang="zh-CN" altLang="en-US"/>
+              <a:t>两个过滤器，一定会出现，其他过滤器依据用户配置是否会出现。</a:t>
+            </a:r>
+            <a:endParaRPr lang="zh-CN" altLang="en-US"/>
+          </a:p>
+        </p:txBody>
+      </p:sp>
+    </p:spTree>
+  </p:cSld>
+  <p:clrMapOvr>
+    <a:masterClrMapping/>
+  </p:clrMapOvr>
+</p:notes>
 </file>
 
 <file path=ppt/slideLayouts/slideLayout1.xml><?xml version="1.0" encoding="utf-8"?>

</xml_diff>

<commit_message>
update authorize logic code
</commit_message>
<xml_diff>
--- a/Spring Security 认证流程.pptx
+++ b/Spring Security 认证流程.pptx
@@ -12,6 +12,12 @@
     <p:sldId id="257" r:id="rId4"/>
     <p:sldId id="258" r:id="rId5"/>
     <p:sldId id="262" r:id="rId7"/>
+    <p:sldId id="263" r:id="rId8"/>
+    <p:sldId id="264" r:id="rId9"/>
+    <p:sldId id="265" r:id="rId10"/>
+    <p:sldId id="266" r:id="rId11"/>
+    <p:sldId id="267" r:id="rId12"/>
+    <p:sldId id="268" r:id="rId13"/>
   </p:sldIdLst>
   <p:sldSz cx="12192000" cy="6858000"/>
   <p:notesSz cx="6858000" cy="9144000"/>
@@ -4956,6 +4962,75 @@
 </p:sld>
 </file>
 
+<file path=ppt/slides/slide10.xml><?xml version="1.0" encoding="utf-8"?>
+<p:sld xmlns:a="http://schemas.openxmlformats.org/drawingml/2006/main" xmlns:r="http://schemas.openxmlformats.org/officeDocument/2006/relationships" xmlns:p="http://schemas.openxmlformats.org/presentationml/2006/main">
+  <p:cSld>
+    <p:spTree>
+      <p:nvGrpSpPr>
+        <p:cNvPr id="1" name=""/>
+        <p:cNvGrpSpPr/>
+        <p:nvPr/>
+      </p:nvGrpSpPr>
+      <p:grpSpPr/>
+      <p:sp>
+        <p:nvSpPr>
+          <p:cNvPr id="2" name="标题 1"/>
+          <p:cNvSpPr>
+            <a:spLocks noGrp="1"/>
+          </p:cNvSpPr>
+          <p:nvPr>
+            <p:ph type="title"/>
+          </p:nvPr>
+        </p:nvSpPr>
+        <p:spPr/>
+        <p:txBody>
+          <a:bodyPr/>
+          <a:p>
+            <a:r>
+              <a:rPr lang="en-US" altLang="zh-CN"/>
+              <a:t>RBAC</a:t>
+            </a:r>
+            <a:endParaRPr lang="en-US" altLang="zh-CN"/>
+          </a:p>
+        </p:txBody>
+      </p:sp>
+      <p:pic>
+        <p:nvPicPr>
+          <p:cNvPr id="4" name="内容占位符 3"/>
+          <p:cNvPicPr>
+            <a:picLocks noChangeAspect="1"/>
+          </p:cNvPicPr>
+          <p:nvPr>
+            <p:ph idx="1"/>
+          </p:nvPr>
+        </p:nvPicPr>
+        <p:blipFill>
+          <a:blip r:embed="rId1"/>
+          <a:stretch>
+            <a:fillRect/>
+          </a:stretch>
+        </p:blipFill>
+        <p:spPr>
+          <a:xfrm>
+            <a:off x="1840230" y="1852295"/>
+            <a:ext cx="8510905" cy="4319905"/>
+          </a:xfrm>
+          <a:prstGeom prst="rect">
+            <a:avLst/>
+          </a:prstGeom>
+        </p:spPr>
+      </p:pic>
+    </p:spTree>
+    <p:custDataLst>
+      <p:tags r:id="rId2"/>
+    </p:custDataLst>
+  </p:cSld>
+  <p:clrMapOvr>
+    <a:masterClrMapping/>
+  </p:clrMapOvr>
+</p:sld>
+</file>
+
 <file path=ppt/slides/slide2.xml><?xml version="1.0" encoding="utf-8"?>
 <p:sld xmlns:a="http://schemas.openxmlformats.org/drawingml/2006/main" xmlns:r="http://schemas.openxmlformats.org/officeDocument/2006/relationships" xmlns:p="http://schemas.openxmlformats.org/presentationml/2006/main">
   <p:cSld>
@@ -5188,6 +5263,335 @@
           <a:xfrm>
             <a:off x="1998980" y="1644015"/>
             <a:ext cx="7833995" cy="4528185"/>
+          </a:xfrm>
+          <a:prstGeom prst="rect">
+            <a:avLst/>
+          </a:prstGeom>
+        </p:spPr>
+      </p:pic>
+    </p:spTree>
+    <p:custDataLst>
+      <p:tags r:id="rId2"/>
+    </p:custDataLst>
+  </p:cSld>
+  <p:clrMapOvr>
+    <a:masterClrMapping/>
+  </p:clrMapOvr>
+</p:sld>
+</file>
+
+<file path=ppt/slides/slide5.xml><?xml version="1.0" encoding="utf-8"?>
+<p:sld xmlns:a="http://schemas.openxmlformats.org/drawingml/2006/main" xmlns:r="http://schemas.openxmlformats.org/officeDocument/2006/relationships" xmlns:p="http://schemas.openxmlformats.org/presentationml/2006/main">
+  <p:cSld>
+    <p:spTree>
+      <p:nvGrpSpPr>
+        <p:cNvPr id="1" name=""/>
+        <p:cNvGrpSpPr/>
+        <p:nvPr/>
+      </p:nvGrpSpPr>
+      <p:grpSpPr/>
+      <p:sp>
+        <p:nvSpPr>
+          <p:cNvPr id="2" name="标题 1"/>
+          <p:cNvSpPr>
+            <a:spLocks noGrp="1"/>
+          </p:cNvSpPr>
+          <p:nvPr>
+            <p:ph type="title"/>
+          </p:nvPr>
+        </p:nvSpPr>
+        <p:spPr/>
+        <p:txBody>
+          <a:bodyPr/>
+          <a:p>
+            <a:r>
+              <a:rPr lang="en-US" altLang="zh-CN"/>
+              <a:t>Spring Security - Remember Me</a:t>
+            </a:r>
+            <a:endParaRPr lang="en-US" altLang="zh-CN"/>
+          </a:p>
+        </p:txBody>
+      </p:sp>
+      <p:pic>
+        <p:nvPicPr>
+          <p:cNvPr id="4" name="内容占位符 3"/>
+          <p:cNvPicPr>
+            <a:picLocks noChangeAspect="1"/>
+          </p:cNvPicPr>
+          <p:nvPr>
+            <p:ph idx="1"/>
+          </p:nvPr>
+        </p:nvPicPr>
+        <p:blipFill>
+          <a:blip r:embed="rId1"/>
+          <a:stretch>
+            <a:fillRect/>
+          </a:stretch>
+        </p:blipFill>
+        <p:spPr>
+          <a:xfrm>
+            <a:off x="1108075" y="1852295"/>
+            <a:ext cx="9975850" cy="4319905"/>
+          </a:xfrm>
+          <a:prstGeom prst="rect">
+            <a:avLst/>
+          </a:prstGeom>
+        </p:spPr>
+      </p:pic>
+    </p:spTree>
+    <p:custDataLst>
+      <p:tags r:id="rId2"/>
+    </p:custDataLst>
+  </p:cSld>
+  <p:clrMapOvr>
+    <a:masterClrMapping/>
+  </p:clrMapOvr>
+</p:sld>
+</file>
+
+<file path=ppt/slides/slide6.xml><?xml version="1.0" encoding="utf-8"?>
+<p:sld xmlns:a="http://schemas.openxmlformats.org/drawingml/2006/main" xmlns:r="http://schemas.openxmlformats.org/officeDocument/2006/relationships" xmlns:p="http://schemas.openxmlformats.org/presentationml/2006/main">
+  <p:cSld>
+    <p:spTree>
+      <p:nvGrpSpPr>
+        <p:cNvPr id="1" name=""/>
+        <p:cNvGrpSpPr/>
+        <p:nvPr/>
+      </p:nvGrpSpPr>
+      <p:grpSpPr/>
+      <p:sp>
+        <p:nvSpPr>
+          <p:cNvPr id="2" name="标题 1"/>
+          <p:cNvSpPr>
+            <a:spLocks noGrp="1"/>
+          </p:cNvSpPr>
+          <p:nvPr>
+            <p:ph type="title"/>
+          </p:nvPr>
+        </p:nvSpPr>
+        <p:spPr/>
+        <p:txBody>
+          <a:bodyPr/>
+          <a:p>
+            <a:endParaRPr lang="zh-CN" altLang="en-US"/>
+          </a:p>
+        </p:txBody>
+      </p:sp>
+      <p:pic>
+        <p:nvPicPr>
+          <p:cNvPr id="4" name="内容占位符 3"/>
+          <p:cNvPicPr>
+            <a:picLocks noChangeAspect="1"/>
+          </p:cNvPicPr>
+          <p:nvPr>
+            <p:ph idx="1"/>
+          </p:nvPr>
+        </p:nvPicPr>
+        <p:blipFill>
+          <a:blip r:embed="rId1"/>
+          <a:stretch>
+            <a:fillRect/>
+          </a:stretch>
+        </p:blipFill>
+        <p:spPr>
+          <a:xfrm>
+            <a:off x="876300" y="2154555"/>
+            <a:ext cx="10440035" cy="3714115"/>
+          </a:xfrm>
+          <a:prstGeom prst="rect">
+            <a:avLst/>
+          </a:prstGeom>
+        </p:spPr>
+      </p:pic>
+    </p:spTree>
+    <p:custDataLst>
+      <p:tags r:id="rId2"/>
+    </p:custDataLst>
+  </p:cSld>
+  <p:clrMapOvr>
+    <a:masterClrMapping/>
+  </p:clrMapOvr>
+</p:sld>
+</file>
+
+<file path=ppt/slides/slide7.xml><?xml version="1.0" encoding="utf-8"?>
+<p:sld xmlns:a="http://schemas.openxmlformats.org/drawingml/2006/main" xmlns:r="http://schemas.openxmlformats.org/officeDocument/2006/relationships" xmlns:p="http://schemas.openxmlformats.org/presentationml/2006/main">
+  <p:cSld>
+    <p:spTree>
+      <p:nvGrpSpPr>
+        <p:cNvPr id="1" name=""/>
+        <p:cNvGrpSpPr/>
+        <p:nvPr/>
+      </p:nvGrpSpPr>
+      <p:grpSpPr/>
+      <p:sp>
+        <p:nvSpPr>
+          <p:cNvPr id="2" name="标题 1"/>
+          <p:cNvSpPr>
+            <a:spLocks noGrp="1"/>
+          </p:cNvSpPr>
+          <p:nvPr>
+            <p:ph type="title"/>
+          </p:nvPr>
+        </p:nvSpPr>
+        <p:spPr/>
+        <p:txBody>
+          <a:bodyPr/>
+          <a:p>
+            <a:endParaRPr lang="zh-CN" altLang="en-US"/>
+          </a:p>
+        </p:txBody>
+      </p:sp>
+      <p:pic>
+        <p:nvPicPr>
+          <p:cNvPr id="4" name="内容占位符 3"/>
+          <p:cNvPicPr>
+            <a:picLocks noChangeAspect="1"/>
+          </p:cNvPicPr>
+          <p:nvPr>
+            <p:ph idx="1"/>
+          </p:nvPr>
+        </p:nvPicPr>
+        <p:blipFill>
+          <a:blip r:embed="rId1"/>
+          <a:stretch>
+            <a:fillRect/>
+          </a:stretch>
+        </p:blipFill>
+        <p:spPr>
+          <a:xfrm>
+            <a:off x="876300" y="2232025"/>
+            <a:ext cx="10440035" cy="3559810"/>
+          </a:xfrm>
+          <a:prstGeom prst="rect">
+            <a:avLst/>
+          </a:prstGeom>
+        </p:spPr>
+      </p:pic>
+    </p:spTree>
+    <p:custDataLst>
+      <p:tags r:id="rId2"/>
+    </p:custDataLst>
+  </p:cSld>
+  <p:clrMapOvr>
+    <a:masterClrMapping/>
+  </p:clrMapOvr>
+</p:sld>
+</file>
+
+<file path=ppt/slides/slide8.xml><?xml version="1.0" encoding="utf-8"?>
+<p:sld xmlns:a="http://schemas.openxmlformats.org/drawingml/2006/main" xmlns:r="http://schemas.openxmlformats.org/officeDocument/2006/relationships" xmlns:p="http://schemas.openxmlformats.org/presentationml/2006/main">
+  <p:cSld>
+    <p:spTree>
+      <p:nvGrpSpPr>
+        <p:cNvPr id="1" name=""/>
+        <p:cNvGrpSpPr/>
+        <p:nvPr/>
+      </p:nvGrpSpPr>
+      <p:grpSpPr/>
+      <p:sp>
+        <p:nvSpPr>
+          <p:cNvPr id="2" name="标题 1"/>
+          <p:cNvSpPr>
+            <a:spLocks noGrp="1"/>
+          </p:cNvSpPr>
+          <p:nvPr>
+            <p:ph type="title"/>
+          </p:nvPr>
+        </p:nvSpPr>
+        <p:spPr/>
+        <p:txBody>
+          <a:bodyPr/>
+          <a:p>
+            <a:endParaRPr lang="zh-CN" altLang="en-US"/>
+          </a:p>
+        </p:txBody>
+      </p:sp>
+      <p:pic>
+        <p:nvPicPr>
+          <p:cNvPr id="4" name="内容占位符 3"/>
+          <p:cNvPicPr>
+            <a:picLocks noChangeAspect="1"/>
+          </p:cNvPicPr>
+          <p:nvPr>
+            <p:ph idx="1"/>
+          </p:nvPr>
+        </p:nvPicPr>
+        <p:blipFill>
+          <a:blip r:embed="rId1"/>
+          <a:stretch>
+            <a:fillRect/>
+          </a:stretch>
+        </p:blipFill>
+        <p:spPr>
+          <a:xfrm>
+            <a:off x="2135505" y="1852295"/>
+            <a:ext cx="7920355" cy="4319905"/>
+          </a:xfrm>
+          <a:prstGeom prst="rect">
+            <a:avLst/>
+          </a:prstGeom>
+        </p:spPr>
+      </p:pic>
+    </p:spTree>
+    <p:custDataLst>
+      <p:tags r:id="rId2"/>
+    </p:custDataLst>
+  </p:cSld>
+  <p:clrMapOvr>
+    <a:masterClrMapping/>
+  </p:clrMapOvr>
+</p:sld>
+</file>
+
+<file path=ppt/slides/slide9.xml><?xml version="1.0" encoding="utf-8"?>
+<p:sld xmlns:a="http://schemas.openxmlformats.org/drawingml/2006/main" xmlns:r="http://schemas.openxmlformats.org/officeDocument/2006/relationships" xmlns:p="http://schemas.openxmlformats.org/presentationml/2006/main">
+  <p:cSld>
+    <p:spTree>
+      <p:nvGrpSpPr>
+        <p:cNvPr id="1" name=""/>
+        <p:cNvGrpSpPr/>
+        <p:nvPr/>
+      </p:nvGrpSpPr>
+      <p:grpSpPr/>
+      <p:sp>
+        <p:nvSpPr>
+          <p:cNvPr id="2" name="标题 1"/>
+          <p:cNvSpPr>
+            <a:spLocks noGrp="1"/>
+          </p:cNvSpPr>
+          <p:nvPr>
+            <p:ph type="title"/>
+          </p:nvPr>
+        </p:nvSpPr>
+        <p:spPr/>
+        <p:txBody>
+          <a:bodyPr/>
+          <a:p>
+            <a:endParaRPr lang="zh-CN" altLang="en-US"/>
+          </a:p>
+        </p:txBody>
+      </p:sp>
+      <p:pic>
+        <p:nvPicPr>
+          <p:cNvPr id="4" name="内容占位符 3"/>
+          <p:cNvPicPr>
+            <a:picLocks noChangeAspect="1"/>
+          </p:cNvPicPr>
+          <p:nvPr>
+            <p:ph idx="1"/>
+          </p:nvPr>
+        </p:nvPicPr>
+        <p:blipFill>
+          <a:blip r:embed="rId1"/>
+          <a:stretch>
+            <a:fillRect/>
+          </a:stretch>
+        </p:blipFill>
+        <p:spPr>
+          <a:xfrm>
+            <a:off x="2135505" y="1852295"/>
+            <a:ext cx="7920355" cy="4319905"/>
           </a:xfrm>
           <a:prstGeom prst="rect">
             <a:avLst/>
@@ -5267,6 +5671,54 @@
 </file>
 
 <file path=ppt/tags/tag13.xml><?xml version="1.0" encoding="utf-8"?>
+<p:tagLst xmlns:p="http://schemas.openxmlformats.org/presentationml/2006/main">
+  <p:tag name="KSO_WM_BEAUTIFY_FLAG" val="#wm#"/>
+  <p:tag name="KSO_WM_TEMPLATE_CATEGORY" val="custom"/>
+  <p:tag name="KSO_WM_TEMPLATE_INDEX" val="20184545"/>
+</p:tagLst>
+</file>
+
+<file path=ppt/tags/tag14.xml><?xml version="1.0" encoding="utf-8"?>
+<p:tagLst xmlns:p="http://schemas.openxmlformats.org/presentationml/2006/main">
+  <p:tag name="KSO_WM_BEAUTIFY_FLAG" val="#wm#"/>
+  <p:tag name="KSO_WM_TEMPLATE_CATEGORY" val="custom"/>
+  <p:tag name="KSO_WM_TEMPLATE_INDEX" val="20184545"/>
+</p:tagLst>
+</file>
+
+<file path=ppt/tags/tag15.xml><?xml version="1.0" encoding="utf-8"?>
+<p:tagLst xmlns:p="http://schemas.openxmlformats.org/presentationml/2006/main">
+  <p:tag name="KSO_WM_BEAUTIFY_FLAG" val="#wm#"/>
+  <p:tag name="KSO_WM_TEMPLATE_CATEGORY" val="custom"/>
+  <p:tag name="KSO_WM_TEMPLATE_INDEX" val="20184545"/>
+</p:tagLst>
+</file>
+
+<file path=ppt/tags/tag16.xml><?xml version="1.0" encoding="utf-8"?>
+<p:tagLst xmlns:p="http://schemas.openxmlformats.org/presentationml/2006/main">
+  <p:tag name="KSO_WM_BEAUTIFY_FLAG" val="#wm#"/>
+  <p:tag name="KSO_WM_TEMPLATE_CATEGORY" val="custom"/>
+  <p:tag name="KSO_WM_TEMPLATE_INDEX" val="20184545"/>
+</p:tagLst>
+</file>
+
+<file path=ppt/tags/tag17.xml><?xml version="1.0" encoding="utf-8"?>
+<p:tagLst xmlns:p="http://schemas.openxmlformats.org/presentationml/2006/main">
+  <p:tag name="KSO_WM_BEAUTIFY_FLAG" val="#wm#"/>
+  <p:tag name="KSO_WM_TEMPLATE_CATEGORY" val="custom"/>
+  <p:tag name="KSO_WM_TEMPLATE_INDEX" val="20184545"/>
+</p:tagLst>
+</file>
+
+<file path=ppt/tags/tag18.xml><?xml version="1.0" encoding="utf-8"?>
+<p:tagLst xmlns:p="http://schemas.openxmlformats.org/presentationml/2006/main">
+  <p:tag name="KSO_WM_BEAUTIFY_FLAG" val="#wm#"/>
+  <p:tag name="KSO_WM_TEMPLATE_CATEGORY" val="custom"/>
+  <p:tag name="KSO_WM_TEMPLATE_INDEX" val="20184545"/>
+</p:tagLst>
+</file>
+
+<file path=ppt/tags/tag19.xml><?xml version="1.0" encoding="utf-8"?>
 <p:tagLst xmlns:p="http://schemas.openxmlformats.org/presentationml/2006/main">
   <p:tag name="KSO_WM_BEAUTIFY_FLAG" val="#wm#"/>
   <p:tag name="KSO_WM_TEMPLATE_CATEGORY" val="custom"/>

</xml_diff>